<commit_message>
deal with weird samples
</commit_message>
<xml_diff>
--- a/GroupHomework/application of information theory.pptx
+++ b/GroupHomework/application of information theory.pptx
@@ -274,7 +274,7 @@
           <a:p>
             <a:fld id="{0C9FC726-01FC-47B1-85F7-D6B204A48443}" type="datetimeFigureOut">
               <a:rPr lang="zh-CN" altLang="en-US" smtClean="0"/>
-              <a:t>2019/10/31</a:t>
+              <a:t>2019/11/2</a:t>
             </a:fld>
             <a:endParaRPr lang="zh-CN" altLang="en-US"/>
           </a:p>
@@ -442,7 +442,7 @@
           <a:p>
             <a:fld id="{0C9FC726-01FC-47B1-85F7-D6B204A48443}" type="datetimeFigureOut">
               <a:rPr lang="zh-CN" altLang="en-US" smtClean="0"/>
-              <a:t>2019/10/31</a:t>
+              <a:t>2019/11/2</a:t>
             </a:fld>
             <a:endParaRPr lang="zh-CN" altLang="en-US"/>
           </a:p>
@@ -620,7 +620,7 @@
           <a:p>
             <a:fld id="{0C9FC726-01FC-47B1-85F7-D6B204A48443}" type="datetimeFigureOut">
               <a:rPr lang="zh-CN" altLang="en-US" smtClean="0"/>
-              <a:t>2019/10/31</a:t>
+              <a:t>2019/11/2</a:t>
             </a:fld>
             <a:endParaRPr lang="zh-CN" altLang="en-US"/>
           </a:p>
@@ -788,7 +788,7 @@
           <a:p>
             <a:fld id="{0C9FC726-01FC-47B1-85F7-D6B204A48443}" type="datetimeFigureOut">
               <a:rPr lang="zh-CN" altLang="en-US" smtClean="0"/>
-              <a:t>2019/10/31</a:t>
+              <a:t>2019/11/2</a:t>
             </a:fld>
             <a:endParaRPr lang="zh-CN" altLang="en-US"/>
           </a:p>
@@ -1033,7 +1033,7 @@
           <a:p>
             <a:fld id="{0C9FC726-01FC-47B1-85F7-D6B204A48443}" type="datetimeFigureOut">
               <a:rPr lang="zh-CN" altLang="en-US" smtClean="0"/>
-              <a:t>2019/10/31</a:t>
+              <a:t>2019/11/2</a:t>
             </a:fld>
             <a:endParaRPr lang="zh-CN" altLang="en-US"/>
           </a:p>
@@ -1262,7 +1262,7 @@
           <a:p>
             <a:fld id="{0C9FC726-01FC-47B1-85F7-D6B204A48443}" type="datetimeFigureOut">
               <a:rPr lang="zh-CN" altLang="en-US" smtClean="0"/>
-              <a:t>2019/10/31</a:t>
+              <a:t>2019/11/2</a:t>
             </a:fld>
             <a:endParaRPr lang="zh-CN" altLang="en-US"/>
           </a:p>
@@ -1626,7 +1626,7 @@
           <a:p>
             <a:fld id="{0C9FC726-01FC-47B1-85F7-D6B204A48443}" type="datetimeFigureOut">
               <a:rPr lang="zh-CN" altLang="en-US" smtClean="0"/>
-              <a:t>2019/10/31</a:t>
+              <a:t>2019/11/2</a:t>
             </a:fld>
             <a:endParaRPr lang="zh-CN" altLang="en-US"/>
           </a:p>
@@ -1743,7 +1743,7 @@
           <a:p>
             <a:fld id="{0C9FC726-01FC-47B1-85F7-D6B204A48443}" type="datetimeFigureOut">
               <a:rPr lang="zh-CN" altLang="en-US" smtClean="0"/>
-              <a:t>2019/10/31</a:t>
+              <a:t>2019/11/2</a:t>
             </a:fld>
             <a:endParaRPr lang="zh-CN" altLang="en-US"/>
           </a:p>
@@ -1838,7 +1838,7 @@
           <a:p>
             <a:fld id="{0C9FC726-01FC-47B1-85F7-D6B204A48443}" type="datetimeFigureOut">
               <a:rPr lang="zh-CN" altLang="en-US" smtClean="0"/>
-              <a:t>2019/10/31</a:t>
+              <a:t>2019/11/2</a:t>
             </a:fld>
             <a:endParaRPr lang="zh-CN" altLang="en-US"/>
           </a:p>
@@ -2113,7 +2113,7 @@
           <a:p>
             <a:fld id="{0C9FC726-01FC-47B1-85F7-D6B204A48443}" type="datetimeFigureOut">
               <a:rPr lang="zh-CN" altLang="en-US" smtClean="0"/>
-              <a:t>2019/10/31</a:t>
+              <a:t>2019/11/2</a:t>
             </a:fld>
             <a:endParaRPr lang="zh-CN" altLang="en-US"/>
           </a:p>
@@ -2365,7 +2365,7 @@
           <a:p>
             <a:fld id="{0C9FC726-01FC-47B1-85F7-D6B204A48443}" type="datetimeFigureOut">
               <a:rPr lang="zh-CN" altLang="en-US" smtClean="0"/>
-              <a:t>2019/10/31</a:t>
+              <a:t>2019/11/2</a:t>
             </a:fld>
             <a:endParaRPr lang="zh-CN" altLang="en-US"/>
           </a:p>
@@ -2576,7 +2576,7 @@
           <a:p>
             <a:fld id="{0C9FC726-01FC-47B1-85F7-D6B204A48443}" type="datetimeFigureOut">
               <a:rPr lang="zh-CN" altLang="en-US" smtClean="0"/>
-              <a:t>2019/10/31</a:t>
+              <a:t>2019/11/2</a:t>
             </a:fld>
             <a:endParaRPr lang="zh-CN" altLang="en-US"/>
           </a:p>
@@ -12083,8 +12083,8 @@
           <a:chExt cx="0" cy="0"/>
         </a:xfrm>
       </p:grpSpPr>
-      <mc:AlternateContent xmlns:mc="http://schemas.openxmlformats.org/markup-compatibility/2006" xmlns:a14="http://schemas.microsoft.com/office/drawing/2010/main">
-        <mc:Choice Requires="a14">
+      <mc:AlternateContent xmlns:mc="http://schemas.openxmlformats.org/markup-compatibility/2006">
+        <mc:Choice xmlns:a14="http://schemas.microsoft.com/office/drawing/2010/main" Requires="a14">
           <p:sp>
             <p:nvSpPr>
               <p:cNvPr id="3" name="内容占位符 2"/>
@@ -12097,7 +12097,7 @@
             </p:nvSpPr>
             <p:spPr>
               <a:xfrm>
-                <a:off x="864577" y="790416"/>
+                <a:off x="926123" y="596985"/>
                 <a:ext cx="10515600" cy="4589584"/>
               </a:xfrm>
             </p:spPr>
@@ -12113,9 +12113,9 @@
                 <a:endParaRPr lang="en-US" altLang="zh-CN" dirty="0"/>
               </a:p>
               <a:p>
-                <a:endParaRPr lang="en-US" altLang="zh-CN" dirty="0"/>
-              </a:p>
-              <a:p>
+                <a:pPr marL="0" indent="0">
+                  <a:buNone/>
+                </a:pPr>
                 <a:endParaRPr lang="en-US" altLang="zh-CN" dirty="0"/>
               </a:p>
               <a:p>
@@ -12167,21 +12167,7 @@
                     <a:latin typeface="Times New Roman" panose="02020603050405020304" pitchFamily="18" charset="0"/>
                     <a:cs typeface="Times New Roman" panose="02020603050405020304" pitchFamily="18" charset="0"/>
                   </a:rPr>
-                  <a:t>For </a:t>
-                </a:r>
-                <a:r>
-                  <a:rPr lang="en-US" altLang="zh-CN">
-                    <a:latin typeface="Times New Roman" panose="02020603050405020304" pitchFamily="18" charset="0"/>
-                    <a:cs typeface="Times New Roman" panose="02020603050405020304" pitchFamily="18" charset="0"/>
-                  </a:rPr>
-                  <a:t>any two </a:t>
-                </a:r>
-                <a:r>
-                  <a:rPr lang="en-US" altLang="zh-CN" dirty="0">
-                    <a:latin typeface="Times New Roman" panose="02020603050405020304" pitchFamily="18" charset="0"/>
-                    <a:cs typeface="Times New Roman" panose="02020603050405020304" pitchFamily="18" charset="0"/>
-                  </a:rPr>
-                  <a:t>documents </a:t>
+                  <a:t>For any two documents </a:t>
                 </a:r>
                 <a14:m>
                   <m:oMath xmlns:m="http://schemas.openxmlformats.org/officeDocument/2006/math">
@@ -12522,7 +12508,7 @@
             </p:txBody>
           </p:sp>
         </mc:Choice>
-        <mc:Fallback xmlns="">
+        <mc:Fallback>
           <p:sp>
             <p:nvSpPr>
               <p:cNvPr id="3" name="内容占位符 2"/>
@@ -12535,7 +12521,7 @@
             </p:nvSpPr>
             <p:spPr>
               <a:xfrm>
-                <a:off x="864577" y="790416"/>
+                <a:off x="926123" y="596985"/>
                 <a:ext cx="10515600" cy="4589584"/>
               </a:xfrm>
               <a:blipFill>

</xml_diff>